<commit_message>
Updating documentation and some other wobbly bits.
</commit_message>
<xml_diff>
--- a/inst/templates/report.pptx
+++ b/inst/templates/report.pptx
@@ -211,7 +211,7 @@
           <a:p>
             <a:fld id="{1B656253-81D4-504C-9F22-C43A5586B7F8}" type="datetimeFigureOut">
               <a:rPr lang="en-US" smtClean="0"/>
-              <a:t>7/4/21</a:t>
+              <a:t>7/5/21</a:t>
             </a:fld>
             <a:endParaRPr lang="en-US"/>
           </a:p>
@@ -377,7 +377,7 @@
           <a:p>
             <a:fld id="{EEA38B4D-A065-A048-981C-DE16882AB0B1}" type="datetimeFigureOut">
               <a:rPr lang="en-US" smtClean="0"/>
-              <a:t>7/4/21</a:t>
+              <a:t>7/5/21</a:t>
             </a:fld>
             <a:endParaRPr lang="en-US"/>
           </a:p>
@@ -812,6 +812,42 @@
           </a:p>
         </p:txBody>
       </p:sp>
+      <p:pic>
+        <p:nvPicPr>
+          <p:cNvPr id="4" name="Picture 3">
+            <a:extLst>
+              <a:ext uri="{FF2B5EF4-FFF2-40B4-BE49-F238E27FC236}">
+                <a16:creationId xmlns:a16="http://schemas.microsoft.com/office/drawing/2014/main" id="{75899800-6C86-9946-AECC-4EE86BC16322}"/>
+              </a:ext>
+            </a:extLst>
+          </p:cNvPr>
+          <p:cNvPicPr>
+            <a:picLocks noChangeAspect="1"/>
+          </p:cNvPicPr>
+          <p:nvPr userDrawn="1"/>
+        </p:nvPicPr>
+        <p:blipFill>
+          <a:blip r:embed="rId2">
+            <a:extLst>
+              <a:ext uri="{28A0092B-C50C-407E-A947-70E740481C1C}">
+                <a14:useLocalDpi xmlns:a14="http://schemas.microsoft.com/office/drawing/2010/main" val="0"/>
+              </a:ext>
+            </a:extLst>
+          </a:blip>
+          <a:stretch>
+            <a:fillRect/>
+          </a:stretch>
+        </p:blipFill>
+        <p:spPr>
+          <a:xfrm>
+            <a:off x="7907167" y="5517232"/>
+            <a:ext cx="1102066" cy="1210112"/>
+          </a:xfrm>
+          <a:prstGeom prst="rect">
+            <a:avLst/>
+          </a:prstGeom>
+        </p:spPr>
+      </p:pic>
     </p:spTree>
     <p:extLst>
       <p:ext uri="{BB962C8B-B14F-4D97-AF65-F5344CB8AC3E}">
@@ -894,7 +930,7 @@
           <a:p>
             <a:fld id="{D871C1FE-9025-5C49-BA5C-C24D6151D8FF}" type="datetime1">
               <a:rPr lang="en-US" smtClean="0"/>
-              <a:t>7/4/21</a:t>
+              <a:t>7/5/21</a:t>
             </a:fld>
             <a:endParaRPr lang="en-GB"/>
           </a:p>
@@ -1008,7 +1044,7 @@
           <a:p>
             <a:fld id="{52BA1850-337E-7747-91FB-64B4051995E4}" type="datetime1">
               <a:rPr lang="en-US" smtClean="0"/>
-              <a:t>7/4/21</a:t>
+              <a:t>7/5/21</a:t>
             </a:fld>
             <a:endParaRPr lang="en-GB"/>
           </a:p>
@@ -1238,7 +1274,7 @@
           <a:p>
             <a:fld id="{AA0DAA0C-97E8-DA4A-9975-EC4E464C2F40}" type="datetime1">
               <a:rPr lang="en-US" smtClean="0"/>
-              <a:t>7/4/21</a:t>
+              <a:t>7/5/21</a:t>
             </a:fld>
             <a:endParaRPr lang="en-GB"/>
           </a:p>
@@ -1555,7 +1591,7 @@
           <a:p>
             <a:fld id="{AA0DAA0C-97E8-DA4A-9975-EC4E464C2F40}" type="datetime1">
               <a:rPr lang="en-US" smtClean="0"/>
-              <a:t>7/4/21</a:t>
+              <a:t>7/5/21</a:t>
             </a:fld>
             <a:endParaRPr lang="en-GB"/>
           </a:p>
@@ -2148,7 +2184,7 @@
           <a:p>
             <a:fld id="{04A76F9C-33B6-4248-95F4-E755A51BE64F}" type="datetime1">
               <a:rPr lang="en-US" smtClean="0"/>
-              <a:t>7/4/21</a:t>
+              <a:t>7/5/21</a:t>
             </a:fld>
             <a:endParaRPr lang="en-GB"/>
           </a:p>
@@ -2701,7 +2737,7 @@
           <a:p>
             <a:fld id="{04A76F9C-33B6-4248-95F4-E755A51BE64F}" type="datetime1">
               <a:rPr lang="en-US" smtClean="0"/>
-              <a:t>7/4/21</a:t>
+              <a:t>7/5/21</a:t>
             </a:fld>
             <a:endParaRPr lang="en-GB"/>
           </a:p>
@@ -3258,7 +3294,7 @@
           <a:p>
             <a:fld id="{7BA53915-059E-FD4B-A198-BD5AD9F97206}" type="datetime1">
               <a:rPr lang="en-US" smtClean="0"/>
-              <a:t>7/4/21</a:t>
+              <a:t>7/5/21</a:t>
             </a:fld>
             <a:endParaRPr lang="en-GB"/>
           </a:p>
@@ -3817,7 +3853,7 @@
           <a:p>
             <a:fld id="{F7C6CE28-510F-5240-BB2D-5CAA84033ED0}" type="datetime1">
               <a:rPr lang="en-US" smtClean="0"/>
-              <a:t>7/4/21</a:t>
+              <a:t>7/5/21</a:t>
             </a:fld>
             <a:endParaRPr lang="en-GB"/>
           </a:p>
@@ -4238,7 +4274,7 @@
           <a:p>
             <a:fld id="{DC8473B6-9DB1-6841-865B-A1275004FC4D}" type="datetime1">
               <a:rPr lang="en-US" smtClean="0"/>
-              <a:t>7/4/21</a:t>
+              <a:t>7/5/21</a:t>
             </a:fld>
             <a:endParaRPr lang="en-GB"/>
           </a:p>
@@ -4462,42 +4498,6 @@
           </a:prstGeom>
         </p:spPr>
       </p:pic>
-      <p:pic>
-        <p:nvPicPr>
-          <p:cNvPr id="8" name="Picture 7">
-            <a:extLst>
-              <a:ext uri="{FF2B5EF4-FFF2-40B4-BE49-F238E27FC236}">
-                <a16:creationId xmlns:a16="http://schemas.microsoft.com/office/drawing/2014/main" id="{4E5C9452-636E-C34E-B717-374A80EE7E38}"/>
-              </a:ext>
-            </a:extLst>
-          </p:cNvPr>
-          <p:cNvPicPr>
-            <a:picLocks noChangeAspect="1"/>
-          </p:cNvPicPr>
-          <p:nvPr userDrawn="1"/>
-        </p:nvPicPr>
-        <p:blipFill>
-          <a:blip r:embed="rId15">
-            <a:extLst>
-              <a:ext uri="{28A0092B-C50C-407E-A947-70E740481C1C}">
-                <a14:useLocalDpi xmlns:a14="http://schemas.microsoft.com/office/drawing/2010/main" val="0"/>
-              </a:ext>
-            </a:extLst>
-          </a:blip>
-          <a:stretch>
-            <a:fillRect/>
-          </a:stretch>
-        </p:blipFill>
-        <p:spPr>
-          <a:xfrm>
-            <a:off x="7981407" y="136525"/>
-            <a:ext cx="1102066" cy="1210112"/>
-          </a:xfrm>
-          <a:prstGeom prst="rect">
-            <a:avLst/>
-          </a:prstGeom>
-        </p:spPr>
-      </p:pic>
       <p:sp>
         <p:nvSpPr>
           <p:cNvPr id="2" name="Title Placeholder 1"/>
@@ -4628,7 +4628,7 @@
           <a:p>
             <a:fld id="{13B1BC43-4B43-954F-8BAE-86993A84B7B7}" type="datetime1">
               <a:rPr lang="en-US" smtClean="0"/>
-              <a:t>7/4/21</a:t>
+              <a:t>7/5/21</a:t>
             </a:fld>
             <a:endParaRPr lang="en-GB" dirty="0"/>
           </a:p>

</xml_diff>

<commit_message>
Updated the PowerPoint report template
</commit_message>
<xml_diff>
--- a/inst/templates/report.pptx
+++ b/inst/templates/report.pptx
@@ -262,7 +262,7 @@
           <a:p>
             <a:fld id="{6AAE82E6-315D-BA41-ACA3-E92985A89493}" type="datetimeFigureOut">
               <a:rPr lang="en-US" smtClean="0"/>
-              <a:t>5/10/24</a:t>
+              <a:t>4/7/25</a:t>
             </a:fld>
             <a:endParaRPr lang="en-US"/>
           </a:p>
@@ -556,7 +556,7 @@
           <a:p>
             <a:fld id="{6AAE82E6-315D-BA41-ACA3-E92985A89493}" type="datetimeFigureOut">
               <a:rPr lang="en-US" smtClean="0"/>
-              <a:t>5/10/24</a:t>
+              <a:t>4/7/25</a:t>
             </a:fld>
             <a:endParaRPr lang="en-US"/>
           </a:p>
@@ -697,7 +697,7 @@
           <a:p>
             <a:fld id="{6AAE82E6-315D-BA41-ACA3-E92985A89493}" type="datetimeFigureOut">
               <a:rPr lang="en-US" smtClean="0"/>
-              <a:t>5/10/24</a:t>
+              <a:t>4/7/25</a:t>
             </a:fld>
             <a:endParaRPr lang="en-US"/>
           </a:p>
@@ -831,7 +831,12 @@
             <p:ph idx="1"/>
           </p:nvPr>
         </p:nvSpPr>
-        <p:spPr/>
+        <p:spPr>
+          <a:xfrm>
+            <a:off x="838200" y="1395663"/>
+            <a:ext cx="10515600" cy="4781299"/>
+          </a:xfrm>
+        </p:spPr>
         <p:txBody>
           <a:bodyPr/>
           <a:lstStyle>
@@ -916,7 +921,7 @@
           <a:p>
             <a:fld id="{6AAE82E6-315D-BA41-ACA3-E92985A89493}" type="datetimeFigureOut">
               <a:rPr lang="en-US" smtClean="0"/>
-              <a:t>5/10/24</a:t>
+              <a:t>4/7/25</a:t>
             </a:fld>
             <a:endParaRPr lang="en-US"/>
           </a:p>
@@ -994,7 +999,7 @@
         </p:nvSpPr>
         <p:spPr>
           <a:xfrm>
-            <a:off x="838199" y="1292066"/>
+            <a:off x="838201" y="681038"/>
             <a:ext cx="10515599" cy="483725"/>
           </a:xfrm>
         </p:spPr>
@@ -1122,7 +1127,12 @@
             <p:ph idx="1"/>
           </p:nvPr>
         </p:nvSpPr>
-        <p:spPr/>
+        <p:spPr>
+          <a:xfrm>
+            <a:off x="838200" y="1414915"/>
+            <a:ext cx="10515600" cy="4762048"/>
+          </a:xfrm>
+        </p:spPr>
         <p:txBody>
           <a:bodyPr/>
           <a:lstStyle/>
@@ -1186,7 +1196,7 @@
           <a:p>
             <a:fld id="{6AAE82E6-315D-BA41-ACA3-E92985A89493}" type="datetimeFigureOut">
               <a:rPr lang="en-US" smtClean="0"/>
-              <a:t>5/10/24</a:t>
+              <a:t>4/7/25</a:t>
             </a:fld>
             <a:endParaRPr lang="en-US"/>
           </a:p>
@@ -1264,7 +1274,7 @@
         </p:nvSpPr>
         <p:spPr>
           <a:xfrm>
-            <a:off x="838199" y="1292066"/>
+            <a:off x="838200" y="685781"/>
             <a:ext cx="10515599" cy="483725"/>
           </a:xfrm>
         </p:spPr>
@@ -1394,8 +1404,8 @@
         </p:nvSpPr>
         <p:spPr>
           <a:xfrm>
-            <a:off x="838200" y="1955177"/>
-            <a:ext cx="5181600" cy="4221785"/>
+            <a:off x="838200" y="1443789"/>
+            <a:ext cx="5181600" cy="4733173"/>
           </a:xfrm>
         </p:spPr>
         <p:txBody>
@@ -1456,8 +1466,8 @@
         </p:nvSpPr>
         <p:spPr>
           <a:xfrm>
-            <a:off x="6172200" y="1955177"/>
-            <a:ext cx="5181600" cy="4221786"/>
+            <a:off x="6172200" y="1443789"/>
+            <a:ext cx="5181600" cy="4733174"/>
           </a:xfrm>
         </p:spPr>
         <p:txBody>
@@ -1523,7 +1533,7 @@
           <a:p>
             <a:fld id="{6AAE82E6-315D-BA41-ACA3-E92985A89493}" type="datetimeFigureOut">
               <a:rPr lang="en-US" smtClean="0"/>
-              <a:t>5/10/24</a:t>
+              <a:t>4/7/25</a:t>
             </a:fld>
             <a:endParaRPr lang="en-US"/>
           </a:p>
@@ -1601,7 +1611,7 @@
         </p:nvSpPr>
         <p:spPr>
           <a:xfrm>
-            <a:off x="838199" y="1292066"/>
+            <a:off x="838200" y="685780"/>
             <a:ext cx="10515599" cy="483725"/>
           </a:xfrm>
         </p:spPr>
@@ -1731,8 +1741,8 @@
         </p:nvSpPr>
         <p:spPr>
           <a:xfrm>
-            <a:off x="838200" y="1955177"/>
-            <a:ext cx="5181600" cy="4221785"/>
+            <a:off x="838200" y="1434163"/>
+            <a:ext cx="5181600" cy="4742799"/>
           </a:xfrm>
         </p:spPr>
         <p:txBody>
@@ -1814,8 +1824,8 @@
         </p:nvSpPr>
         <p:spPr>
           <a:xfrm>
-            <a:off x="6172200" y="1955177"/>
-            <a:ext cx="5181600" cy="4221786"/>
+            <a:off x="6172200" y="1434164"/>
+            <a:ext cx="5181600" cy="4742799"/>
           </a:xfrm>
         </p:spPr>
         <p:txBody>
@@ -1902,7 +1912,7 @@
           <a:p>
             <a:fld id="{6AAE82E6-315D-BA41-ACA3-E92985A89493}" type="datetimeFigureOut">
               <a:rPr lang="en-US" smtClean="0"/>
-              <a:t>5/10/24</a:t>
+              <a:t>4/7/25</a:t>
             </a:fld>
             <a:endParaRPr lang="en-US"/>
           </a:p>
@@ -1980,7 +1990,7 @@
         </p:nvSpPr>
         <p:spPr>
           <a:xfrm>
-            <a:off x="838199" y="1292066"/>
+            <a:off x="838200" y="681037"/>
             <a:ext cx="10515599" cy="483725"/>
           </a:xfrm>
         </p:spPr>
@@ -2115,7 +2125,7 @@
         </p:nvSpPr>
         <p:spPr>
           <a:xfrm>
-            <a:off x="839788" y="1942477"/>
+            <a:off x="838199" y="1419316"/>
             <a:ext cx="5157787" cy="562597"/>
           </a:xfrm>
         </p:spPr>
@@ -2186,8 +2196,8 @@
         </p:nvSpPr>
         <p:spPr>
           <a:xfrm>
-            <a:off x="839788" y="2505075"/>
-            <a:ext cx="5157787" cy="3684588"/>
+            <a:off x="838199" y="1981913"/>
+            <a:ext cx="5157787" cy="4158133"/>
           </a:xfrm>
         </p:spPr>
         <p:txBody>
@@ -2248,7 +2258,7 @@
         </p:nvSpPr>
         <p:spPr>
           <a:xfrm>
-            <a:off x="6172200" y="1942477"/>
+            <a:off x="6170611" y="1419316"/>
             <a:ext cx="5183188" cy="562598"/>
           </a:xfrm>
         </p:spPr>
@@ -2319,8 +2329,8 @@
         </p:nvSpPr>
         <p:spPr>
           <a:xfrm>
-            <a:off x="6172200" y="2505075"/>
-            <a:ext cx="5183188" cy="3684588"/>
+            <a:off x="6170611" y="1981914"/>
+            <a:ext cx="5183188" cy="4158132"/>
           </a:xfrm>
         </p:spPr>
         <p:txBody>
@@ -2386,7 +2396,7 @@
           <a:p>
             <a:fld id="{6AAE82E6-315D-BA41-ACA3-E92985A89493}" type="datetimeFigureOut">
               <a:rPr lang="en-US" smtClean="0"/>
-              <a:t>5/10/24</a:t>
+              <a:t>4/7/25</a:t>
             </a:fld>
             <a:endParaRPr lang="en-US"/>
           </a:p>
@@ -2464,7 +2474,7 @@
         </p:nvSpPr>
         <p:spPr>
           <a:xfrm>
-            <a:off x="838199" y="1292066"/>
+            <a:off x="838200" y="717953"/>
             <a:ext cx="10515599" cy="483725"/>
           </a:xfrm>
         </p:spPr>
@@ -2599,7 +2609,7 @@
         </p:nvSpPr>
         <p:spPr>
           <a:xfrm>
-            <a:off x="839788" y="1942477"/>
+            <a:off x="838200" y="1404745"/>
             <a:ext cx="5157787" cy="562597"/>
           </a:xfrm>
         </p:spPr>
@@ -2670,8 +2680,8 @@
         </p:nvSpPr>
         <p:spPr>
           <a:xfrm>
-            <a:off x="839788" y="2505075"/>
-            <a:ext cx="5157787" cy="3684588"/>
+            <a:off x="838200" y="1967343"/>
+            <a:ext cx="5157787" cy="4217577"/>
           </a:xfrm>
         </p:spPr>
         <p:txBody>
@@ -2732,7 +2742,7 @@
         </p:nvSpPr>
         <p:spPr>
           <a:xfrm>
-            <a:off x="6172200" y="1942477"/>
+            <a:off x="6170612" y="1404745"/>
             <a:ext cx="5183188" cy="562598"/>
           </a:xfrm>
         </p:spPr>
@@ -2803,8 +2813,8 @@
         </p:nvSpPr>
         <p:spPr>
           <a:xfrm>
-            <a:off x="6172200" y="2505075"/>
-            <a:ext cx="5183188" cy="3684588"/>
+            <a:off x="6170612" y="1967342"/>
+            <a:ext cx="5183188" cy="4217577"/>
           </a:xfrm>
         </p:spPr>
         <p:txBody>
@@ -2870,7 +2880,7 @@
           <a:p>
             <a:fld id="{6AAE82E6-315D-BA41-ACA3-E92985A89493}" type="datetimeFigureOut">
               <a:rPr lang="en-US" smtClean="0"/>
-              <a:t>5/10/24</a:t>
+              <a:t>4/7/25</a:t>
             </a:fld>
             <a:endParaRPr lang="en-US"/>
           </a:p>
@@ -2948,7 +2958,7 @@
         </p:nvSpPr>
         <p:spPr>
           <a:xfrm>
-            <a:off x="838199" y="1292066"/>
+            <a:off x="838201" y="673080"/>
             <a:ext cx="10515599" cy="483725"/>
           </a:xfrm>
         </p:spPr>
@@ -3051,8 +3061,8 @@
         </p:nvSpPr>
         <p:spPr>
           <a:xfrm>
-            <a:off x="1" y="71994"/>
-            <a:ext cx="12192000" cy="1825625"/>
+            <a:off x="0" y="0"/>
+            <a:ext cx="12191999" cy="1252600"/>
           </a:xfrm>
           <a:prstGeom prst="rect">
             <a:avLst/>
@@ -3108,7 +3118,7 @@
         <p:spPr>
           <a:xfrm>
             <a:off x="838200" y="111125"/>
-            <a:ext cx="10515600" cy="1180941"/>
+            <a:ext cx="10515600" cy="569913"/>
           </a:xfrm>
           <a:prstGeom prst="rect">
             <a:avLst/>
@@ -3145,8 +3155,8 @@
         </p:nvSpPr>
         <p:spPr>
           <a:xfrm>
-            <a:off x="838200" y="1936749"/>
-            <a:ext cx="10515600" cy="4240213"/>
+            <a:off x="838200" y="1424539"/>
+            <a:ext cx="10515600" cy="4752423"/>
           </a:xfrm>
           <a:prstGeom prst="rect">
             <a:avLst/>
@@ -3235,7 +3245,7 @@
           <a:p>
             <a:fld id="{6AAE82E6-315D-BA41-ACA3-E92985A89493}" type="datetimeFigureOut">
               <a:rPr lang="en-US" smtClean="0"/>
-              <a:t>5/10/24</a:t>
+              <a:t>4/7/25</a:t>
             </a:fld>
             <a:endParaRPr lang="en-US"/>
           </a:p>
@@ -3345,8 +3355,8 @@
         </p:nvSpPr>
         <p:spPr>
           <a:xfrm>
-            <a:off x="0" y="1794746"/>
-            <a:ext cx="12192000" cy="104618"/>
+            <a:off x="0" y="1226579"/>
+            <a:ext cx="12191999" cy="104618"/>
           </a:xfrm>
           <a:prstGeom prst="rect">
             <a:avLst/>

</xml_diff>